<commit_message>
Updated proposal, presentation, included basic plot
</commit_message>
<xml_diff>
--- a/thisisapresentation.pptx
+++ b/thisisapresentation.pptx
@@ -8,8 +8,12 @@
     <p:sldId id="256" r:id="rId2"/>
     <p:sldId id="257" r:id="rId3"/>
     <p:sldId id="258" r:id="rId4"/>
-    <p:sldId id="260" r:id="rId5"/>
-    <p:sldId id="259" r:id="rId6"/>
+    <p:sldId id="261" r:id="rId5"/>
+    <p:sldId id="260" r:id="rId6"/>
+    <p:sldId id="262" r:id="rId7"/>
+    <p:sldId id="263" r:id="rId8"/>
+    <p:sldId id="264" r:id="rId9"/>
+    <p:sldId id="259" r:id="rId10"/>
   </p:sldIdLst>
   <p:sldSz cx="9144000" cy="6858000" type="screen4x3"/>
   <p:notesSz cx="6858000" cy="9144000"/>
@@ -301,7 +305,7 @@
           <a:p>
             <a:fld id="{2814616D-1EBE-4788-A7CD-007AFEB5FA66}" type="datetimeFigureOut">
               <a:rPr lang="en-US" smtClean="0"/>
-              <a:t>2/19/2013</a:t>
+              <a:t>2/19/13</a:t>
             </a:fld>
             <a:endParaRPr lang="en-US"/>
           </a:p>
@@ -486,7 +490,7 @@
           <a:p>
             <a:fld id="{2814616D-1EBE-4788-A7CD-007AFEB5FA66}" type="datetimeFigureOut">
               <a:rPr lang="en-US" smtClean="0"/>
-              <a:t>2/19/2013</a:t>
+              <a:t>2/19/13</a:t>
             </a:fld>
             <a:endParaRPr lang="en-US"/>
           </a:p>
@@ -681,7 +685,7 @@
           <a:p>
             <a:fld id="{2814616D-1EBE-4788-A7CD-007AFEB5FA66}" type="datetimeFigureOut">
               <a:rPr lang="en-US" smtClean="0"/>
-              <a:t>2/19/2013</a:t>
+              <a:t>2/19/13</a:t>
             </a:fld>
             <a:endParaRPr lang="en-US"/>
           </a:p>
@@ -866,7 +870,7 @@
           <a:p>
             <a:fld id="{2814616D-1EBE-4788-A7CD-007AFEB5FA66}" type="datetimeFigureOut">
               <a:rPr lang="en-US" smtClean="0"/>
-              <a:t>2/19/2013</a:t>
+              <a:t>2/19/13</a:t>
             </a:fld>
             <a:endParaRPr lang="en-US"/>
           </a:p>
@@ -1127,7 +1131,7 @@
           <a:p>
             <a:fld id="{2814616D-1EBE-4788-A7CD-007AFEB5FA66}" type="datetimeFigureOut">
               <a:rPr lang="en-US" smtClean="0"/>
-              <a:t>2/19/2013</a:t>
+              <a:t>2/19/13</a:t>
             </a:fld>
             <a:endParaRPr lang="en-US"/>
           </a:p>
@@ -1433,7 +1437,7 @@
           <a:p>
             <a:fld id="{2814616D-1EBE-4788-A7CD-007AFEB5FA66}" type="datetimeFigureOut">
               <a:rPr lang="en-US" smtClean="0"/>
-              <a:t>2/19/2013</a:t>
+              <a:t>2/19/13</a:t>
             </a:fld>
             <a:endParaRPr lang="en-US"/>
           </a:p>
@@ -1879,7 +1883,7 @@
           <a:p>
             <a:fld id="{2814616D-1EBE-4788-A7CD-007AFEB5FA66}" type="datetimeFigureOut">
               <a:rPr lang="en-US" smtClean="0"/>
-              <a:t>2/19/2013</a:t>
+              <a:t>2/19/13</a:t>
             </a:fld>
             <a:endParaRPr lang="en-US"/>
           </a:p>
@@ -2009,7 +2013,7 @@
           <a:p>
             <a:fld id="{2814616D-1EBE-4788-A7CD-007AFEB5FA66}" type="datetimeFigureOut">
               <a:rPr lang="en-US" smtClean="0"/>
-              <a:t>2/19/2013</a:t>
+              <a:t>2/19/13</a:t>
             </a:fld>
             <a:endParaRPr lang="en-US"/>
           </a:p>
@@ -2113,7 +2117,7 @@
           <a:p>
             <a:fld id="{2814616D-1EBE-4788-A7CD-007AFEB5FA66}" type="datetimeFigureOut">
               <a:rPr lang="en-US" smtClean="0"/>
-              <a:t>2/19/2013</a:t>
+              <a:t>2/19/13</a:t>
             </a:fld>
             <a:endParaRPr lang="en-US"/>
           </a:p>
@@ -2408,7 +2412,7 @@
           <a:p>
             <a:fld id="{2814616D-1EBE-4788-A7CD-007AFEB5FA66}" type="datetimeFigureOut">
               <a:rPr lang="en-US" smtClean="0"/>
-              <a:t>2/19/2013</a:t>
+              <a:t>2/19/13</a:t>
             </a:fld>
             <a:endParaRPr lang="en-US"/>
           </a:p>
@@ -2679,7 +2683,7 @@
           <a:p>
             <a:fld id="{2814616D-1EBE-4788-A7CD-007AFEB5FA66}" type="datetimeFigureOut">
               <a:rPr lang="en-US" smtClean="0"/>
-              <a:t>2/19/2013</a:t>
+              <a:t>2/19/13</a:t>
             </a:fld>
             <a:endParaRPr lang="en-US"/>
           </a:p>
@@ -2907,7 +2911,7 @@
           <a:p>
             <a:fld id="{2814616D-1EBE-4788-A7CD-007AFEB5FA66}" type="datetimeFigureOut">
               <a:rPr lang="en-US" smtClean="0"/>
-              <a:t>2/19/2013</a:t>
+              <a:t>2/19/13</a:t>
             </a:fld>
             <a:endParaRPr lang="en-US"/>
           </a:p>
@@ -3437,7 +3441,9 @@
         </p:nvSpPr>
         <p:spPr/>
         <p:txBody>
-          <a:bodyPr/>
+          <a:bodyPr>
+            <a:normAutofit lnSpcReduction="10000"/>
+          </a:bodyPr>
           <a:lstStyle/>
           <a:p>
             <a:r>
@@ -3588,6 +3594,9 @@
           </a:bodyPr>
           <a:lstStyle/>
           <a:p>
+            <a:pPr marL="0" indent="0">
+              <a:buNone/>
+            </a:pPr>
             <a:r>
               <a:rPr lang="en-US" dirty="0" smtClean="0"/>
               <a:t>There are four primary functions for </a:t>
@@ -3669,6 +3678,106 @@
           </p:cNvSpPr>
           <p:nvPr>
             <p:ph type="title"/>
+          </p:nvPr>
+        </p:nvSpPr>
+        <p:spPr/>
+        <p:txBody>
+          <a:bodyPr/>
+          <a:lstStyle/>
+          <a:p>
+            <a:r>
+              <a:rPr lang="en-US" dirty="0" smtClean="0"/>
+              <a:t>Expectations</a:t>
+            </a:r>
+            <a:endParaRPr lang="en-US" dirty="0"/>
+          </a:p>
+        </p:txBody>
+      </p:sp>
+      <p:sp>
+        <p:nvSpPr>
+          <p:cNvPr id="3" name="Content Placeholder 2"/>
+          <p:cNvSpPr>
+            <a:spLocks noGrp="1"/>
+          </p:cNvSpPr>
+          <p:nvPr>
+            <p:ph idx="1"/>
+          </p:nvPr>
+        </p:nvSpPr>
+        <p:spPr/>
+        <p:txBody>
+          <a:bodyPr/>
+          <a:lstStyle/>
+          <a:p>
+            <a:pPr>
+              <a:buFont typeface="Arial"/>
+              <a:buChar char="•"/>
+            </a:pPr>
+            <a:r>
+              <a:rPr lang="en-US" dirty="0" smtClean="0"/>
+              <a:t>The metal ions are, as you would expect, ionic. </a:t>
+            </a:r>
+          </a:p>
+          <a:p>
+            <a:pPr>
+              <a:buFont typeface="Arial"/>
+              <a:buChar char="•"/>
+            </a:pPr>
+            <a:r>
+              <a:rPr lang="en-US" dirty="0" smtClean="0"/>
+              <a:t>They would not be able to fulfill their purposes if allowed to interact with (polar) water.</a:t>
+            </a:r>
+          </a:p>
+          <a:p>
+            <a:pPr>
+              <a:buFont typeface="Arial"/>
+              <a:buChar char="•"/>
+            </a:pPr>
+            <a:r>
+              <a:rPr lang="en-US" dirty="0" smtClean="0"/>
+              <a:t>So we expect any metal ions to be well- wrapped.</a:t>
+            </a:r>
+            <a:endParaRPr lang="en-US" dirty="0"/>
+          </a:p>
+        </p:txBody>
+      </p:sp>
+    </p:spTree>
+    <p:extLst>
+      <p:ext uri="{BB962C8B-B14F-4D97-AF65-F5344CB8AC3E}">
+        <p14:creationId xmlns:p14="http://schemas.microsoft.com/office/powerpoint/2010/main" val="4134972085"/>
+      </p:ext>
+    </p:extLst>
+  </p:cSld>
+  <p:clrMapOvr>
+    <a:masterClrMapping/>
+  </p:clrMapOvr>
+</p:sld>
+</file>
+
+<file path=ppt/slides/slide5.xml><?xml version="1.0" encoding="utf-8"?>
+<p:sld xmlns:a="http://schemas.openxmlformats.org/drawingml/2006/main" xmlns:r="http://schemas.openxmlformats.org/officeDocument/2006/relationships" xmlns:p="http://schemas.openxmlformats.org/presentationml/2006/main">
+  <p:cSld>
+    <p:spTree>
+      <p:nvGrpSpPr>
+        <p:cNvPr id="1" name=""/>
+        <p:cNvGrpSpPr/>
+        <p:nvPr/>
+      </p:nvGrpSpPr>
+      <p:grpSpPr>
+        <a:xfrm>
+          <a:off x="0" y="0"/>
+          <a:ext cx="0" cy="0"/>
+          <a:chOff x="0" y="0"/>
+          <a:chExt cx="0" cy="0"/>
+        </a:xfrm>
+      </p:grpSpPr>
+      <p:sp>
+        <p:nvSpPr>
+          <p:cNvPr id="2" name="Title 1"/>
+          <p:cNvSpPr>
+            <a:spLocks noGrp="1"/>
+          </p:cNvSpPr>
+          <p:nvPr>
+            <p:ph type="title"/>
             <p:custDataLst>
               <p:tags r:id="rId2"/>
             </p:custDataLst>
@@ -3707,19 +3816,43 @@
           <a:p>
             <a:r>
               <a:rPr lang="en-US" dirty="0" smtClean="0"/>
-              <a:t>The selected proteins have as many as 4 well wrapped metal ions. </a:t>
-            </a:r>
-          </a:p>
-          <a:p>
+              <a:t>Standard ratio of </a:t>
+            </a:r>
             <a:r>
               <a:rPr lang="en-US" dirty="0" smtClean="0"/>
-              <a:t>This means that these metal ions are crucial to the performance of </a:t>
-            </a:r>
-            <a:r>
-              <a:rPr lang="en-US" smtClean="0"/>
-              <a:t>the protein. </a:t>
-            </a:r>
-            <a:endParaRPr lang="en-US"/>
+              <a:t>#(Metal ions) : #(</a:t>
+            </a:r>
+            <a:r>
+              <a:rPr lang="en-US" dirty="0" err="1" smtClean="0"/>
+              <a:t>Desolvation</a:t>
+            </a:r>
+            <a:r>
+              <a:rPr lang="en-US" dirty="0" smtClean="0"/>
+              <a:t> shells with metal ions) is &gt; 1 , so                  well-wrapped.</a:t>
+            </a:r>
+          </a:p>
+          <a:p>
+            <a:r>
+              <a:rPr lang="en-US" dirty="0" smtClean="0"/>
+              <a:t>One exception (</a:t>
+            </a:r>
+            <a:r>
+              <a:rPr lang="en-US" dirty="0" err="1"/>
+              <a:t>Ribonecleoside-diphosphate</a:t>
+            </a:r>
+            <a:r>
+              <a:rPr lang="en-US" dirty="0"/>
+              <a:t> </a:t>
+            </a:r>
+            <a:r>
+              <a:rPr lang="en-US" dirty="0" err="1"/>
+              <a:t>reductase</a:t>
+            </a:r>
+            <a:r>
+              <a:rPr lang="en-US" dirty="0" smtClean="0"/>
+              <a:t>) which had two magnesium ions, each unwrapped.</a:t>
+            </a:r>
+            <a:endParaRPr lang="en-US" dirty="0"/>
           </a:p>
         </p:txBody>
       </p:sp>
@@ -3739,7 +3872,292 @@
 </p:sld>
 </file>
 
-<file path=ppt/slides/slide5.xml><?xml version="1.0" encoding="utf-8"?>
+<file path=ppt/slides/slide6.xml><?xml version="1.0" encoding="utf-8"?>
+<p:sld xmlns:a="http://schemas.openxmlformats.org/drawingml/2006/main" xmlns:r="http://schemas.openxmlformats.org/officeDocument/2006/relationships" xmlns:p="http://schemas.openxmlformats.org/presentationml/2006/main">
+  <p:cSld>
+    <p:spTree>
+      <p:nvGrpSpPr>
+        <p:cNvPr id="1" name=""/>
+        <p:cNvGrpSpPr/>
+        <p:nvPr/>
+      </p:nvGrpSpPr>
+      <p:grpSpPr>
+        <a:xfrm>
+          <a:off x="0" y="0"/>
+          <a:ext cx="0" cy="0"/>
+          <a:chOff x="0" y="0"/>
+          <a:chExt cx="0" cy="0"/>
+        </a:xfrm>
+      </p:grpSpPr>
+      <p:pic>
+        <p:nvPicPr>
+          <p:cNvPr id="8" name="Content Placeholder 7" descr="myfig.png"/>
+          <p:cNvPicPr>
+            <a:picLocks noGrp="1" noChangeAspect="1"/>
+          </p:cNvPicPr>
+          <p:nvPr>
+            <p:ph idx="1"/>
+          </p:nvPr>
+        </p:nvPicPr>
+        <p:blipFill>
+          <a:blip r:embed="rId2">
+            <a:extLst>
+              <a:ext uri="{28A0092B-C50C-407E-A947-70E740481C1C}">
+                <a14:useLocalDpi xmlns:a14="http://schemas.microsoft.com/office/drawing/2010/main" val="0"/>
+              </a:ext>
+            </a:extLst>
+          </a:blip>
+          <a:srcRect l="291" r="291"/>
+          <a:stretch>
+            <a:fillRect/>
+          </a:stretch>
+        </p:blipFill>
+        <p:spPr>
+          <a:xfrm>
+            <a:off x="228600" y="152400"/>
+            <a:ext cx="8686800" cy="6553200"/>
+          </a:xfrm>
+        </p:spPr>
+      </p:pic>
+    </p:spTree>
+    <p:extLst>
+      <p:ext uri="{BB962C8B-B14F-4D97-AF65-F5344CB8AC3E}">
+        <p14:creationId xmlns:p14="http://schemas.microsoft.com/office/powerpoint/2010/main" val="3614862402"/>
+      </p:ext>
+    </p:extLst>
+  </p:cSld>
+  <p:clrMapOvr>
+    <a:masterClrMapping/>
+  </p:clrMapOvr>
+</p:sld>
+</file>
+
+<file path=ppt/slides/slide7.xml><?xml version="1.0" encoding="utf-8"?>
+<p:sld xmlns:a="http://schemas.openxmlformats.org/drawingml/2006/main" xmlns:r="http://schemas.openxmlformats.org/officeDocument/2006/relationships" xmlns:p="http://schemas.openxmlformats.org/presentationml/2006/main">
+  <p:cSld>
+    <p:spTree>
+      <p:nvGrpSpPr>
+        <p:cNvPr id="1" name=""/>
+        <p:cNvGrpSpPr/>
+        <p:nvPr/>
+      </p:nvGrpSpPr>
+      <p:grpSpPr>
+        <a:xfrm>
+          <a:off x="0" y="0"/>
+          <a:ext cx="0" cy="0"/>
+          <a:chOff x="0" y="0"/>
+          <a:chExt cx="0" cy="0"/>
+        </a:xfrm>
+      </p:grpSpPr>
+      <p:sp>
+        <p:nvSpPr>
+          <p:cNvPr id="2" name="Title 1"/>
+          <p:cNvSpPr>
+            <a:spLocks noGrp="1"/>
+          </p:cNvSpPr>
+          <p:nvPr>
+            <p:ph type="title"/>
+          </p:nvPr>
+        </p:nvSpPr>
+        <p:spPr/>
+        <p:txBody>
+          <a:bodyPr/>
+          <a:lstStyle/>
+          <a:p>
+            <a:r>
+              <a:rPr lang="en-US" dirty="0" smtClean="0"/>
+              <a:t>Specific Metals</a:t>
+            </a:r>
+            <a:endParaRPr lang="en-US" dirty="0"/>
+          </a:p>
+        </p:txBody>
+      </p:sp>
+      <p:sp>
+        <p:nvSpPr>
+          <p:cNvPr id="3" name="Content Placeholder 2"/>
+          <p:cNvSpPr>
+            <a:spLocks noGrp="1"/>
+          </p:cNvSpPr>
+          <p:nvPr>
+            <p:ph idx="1"/>
+          </p:nvPr>
+        </p:nvSpPr>
+        <p:spPr/>
+        <p:txBody>
+          <a:bodyPr/>
+          <a:lstStyle/>
+          <a:p>
+            <a:r>
+              <a:rPr lang="en-US" dirty="0" smtClean="0"/>
+              <a:t>Iron and magnesium tend to be the least well-wrapped, perhaps because they appear in large groups (like the </a:t>
+            </a:r>
+            <a:r>
+              <a:rPr lang="en-US" dirty="0" err="1" smtClean="0"/>
+              <a:t>heme</a:t>
+            </a:r>
+            <a:r>
+              <a:rPr lang="en-US" dirty="0" smtClean="0"/>
+              <a:t> group, for iron)</a:t>
+            </a:r>
+          </a:p>
+          <a:p>
+            <a:r>
+              <a:rPr lang="en-US" dirty="0" smtClean="0"/>
+              <a:t>Copper and zinc tend to be be best-wrapped</a:t>
+            </a:r>
+          </a:p>
+          <a:p>
+            <a:r>
+              <a:rPr lang="en-US" dirty="0" err="1" smtClean="0"/>
+              <a:t>Cadherins</a:t>
+            </a:r>
+            <a:r>
+              <a:rPr lang="en-US" dirty="0" smtClean="0"/>
+              <a:t> tend toward the middle of </a:t>
+            </a:r>
+            <a:r>
+              <a:rPr lang="en-US" dirty="0" err="1" smtClean="0"/>
+              <a:t>metalloproteins</a:t>
+            </a:r>
+            <a:endParaRPr lang="en-US" dirty="0" smtClean="0"/>
+          </a:p>
+          <a:p>
+            <a:pPr marL="0" indent="0">
+              <a:buNone/>
+            </a:pPr>
+            <a:endParaRPr lang="en-US" dirty="0" smtClean="0"/>
+          </a:p>
+          <a:p>
+            <a:pPr marL="0" indent="0">
+              <a:buNone/>
+            </a:pPr>
+            <a:endParaRPr lang="en-US" dirty="0"/>
+          </a:p>
+        </p:txBody>
+      </p:sp>
+    </p:spTree>
+    <p:extLst>
+      <p:ext uri="{BB962C8B-B14F-4D97-AF65-F5344CB8AC3E}">
+        <p14:creationId xmlns:p14="http://schemas.microsoft.com/office/powerpoint/2010/main" val="3100562610"/>
+      </p:ext>
+    </p:extLst>
+  </p:cSld>
+  <p:clrMapOvr>
+    <a:masterClrMapping/>
+  </p:clrMapOvr>
+</p:sld>
+</file>
+
+<file path=ppt/slides/slide8.xml><?xml version="1.0" encoding="utf-8"?>
+<p:sld xmlns:a="http://schemas.openxmlformats.org/drawingml/2006/main" xmlns:r="http://schemas.openxmlformats.org/officeDocument/2006/relationships" xmlns:p="http://schemas.openxmlformats.org/presentationml/2006/main">
+  <p:cSld>
+    <p:spTree>
+      <p:nvGrpSpPr>
+        <p:cNvPr id="1" name=""/>
+        <p:cNvGrpSpPr/>
+        <p:nvPr/>
+      </p:nvGrpSpPr>
+      <p:grpSpPr>
+        <a:xfrm>
+          <a:off x="0" y="0"/>
+          <a:ext cx="0" cy="0"/>
+          <a:chOff x="0" y="0"/>
+          <a:chExt cx="0" cy="0"/>
+        </a:xfrm>
+      </p:grpSpPr>
+      <p:sp>
+        <p:nvSpPr>
+          <p:cNvPr id="2" name="Title 1"/>
+          <p:cNvSpPr>
+            <a:spLocks noGrp="1"/>
+          </p:cNvSpPr>
+          <p:nvPr>
+            <p:ph type="title"/>
+          </p:nvPr>
+        </p:nvSpPr>
+        <p:spPr/>
+        <p:txBody>
+          <a:bodyPr/>
+          <a:lstStyle/>
+          <a:p>
+            <a:r>
+              <a:rPr lang="en-US" dirty="0" smtClean="0"/>
+              <a:t>To be worked on</a:t>
+            </a:r>
+            <a:endParaRPr lang="en-US" dirty="0"/>
+          </a:p>
+        </p:txBody>
+      </p:sp>
+      <p:sp>
+        <p:nvSpPr>
+          <p:cNvPr id="3" name="Content Placeholder 2"/>
+          <p:cNvSpPr>
+            <a:spLocks noGrp="1"/>
+          </p:cNvSpPr>
+          <p:nvPr>
+            <p:ph idx="1"/>
+          </p:nvPr>
+        </p:nvSpPr>
+        <p:spPr/>
+        <p:txBody>
+          <a:bodyPr/>
+          <a:lstStyle/>
+          <a:p>
+            <a:r>
+              <a:rPr lang="en-US" dirty="0" smtClean="0"/>
+              <a:t>Organize the </a:t>
+            </a:r>
+            <a:r>
+              <a:rPr lang="en-US" smtClean="0"/>
+              <a:t>breakdown by </a:t>
+            </a:r>
+            <a:r>
+              <a:rPr lang="en-US" dirty="0" smtClean="0"/>
+              <a:t>metal more thoroughly</a:t>
+            </a:r>
+          </a:p>
+          <a:p>
+            <a:r>
+              <a:rPr lang="en-US" dirty="0" smtClean="0"/>
+              <a:t>Get more precise data on distances from </a:t>
+            </a:r>
+            <a:r>
+              <a:rPr lang="en-US" dirty="0" err="1" smtClean="0"/>
+              <a:t>dehydrons</a:t>
+            </a:r>
+            <a:endParaRPr lang="en-US" dirty="0" smtClean="0"/>
+          </a:p>
+          <a:p>
+            <a:r>
+              <a:rPr lang="en-US" dirty="0" smtClean="0"/>
+              <a:t>Analyze position within </a:t>
+            </a:r>
+            <a:r>
+              <a:rPr lang="en-US" dirty="0" err="1" smtClean="0"/>
+              <a:t>desolvation</a:t>
+            </a:r>
+            <a:r>
+              <a:rPr lang="en-US" dirty="0" smtClean="0"/>
+              <a:t> shells</a:t>
+            </a:r>
+            <a:endParaRPr lang="en-US" dirty="0"/>
+          </a:p>
+        </p:txBody>
+      </p:sp>
+    </p:spTree>
+    <p:extLst>
+      <p:ext uri="{BB962C8B-B14F-4D97-AF65-F5344CB8AC3E}">
+        <p14:creationId xmlns:p14="http://schemas.microsoft.com/office/powerpoint/2010/main" val="1318868437"/>
+      </p:ext>
+    </p:extLst>
+  </p:cSld>
+  <p:clrMapOvr>
+    <a:masterClrMapping/>
+  </p:clrMapOvr>
+</p:sld>
+</file>
+
+<file path=ppt/slides/slide9.xml><?xml version="1.0" encoding="utf-8"?>
 <p:sld xmlns:a="http://schemas.openxmlformats.org/drawingml/2006/main" xmlns:r="http://schemas.openxmlformats.org/officeDocument/2006/relationships" xmlns:p="http://schemas.openxmlformats.org/presentationml/2006/main">
   <p:cSld>
     <p:spTree>

</xml_diff>